<commit_message>
fix code and pptx
</commit_message>
<xml_diff>
--- a/Homework 1/Visual Analytics - Homework I.pptx
+++ b/Homework 1/Visual Analytics - Homework I.pptx
@@ -3948,7 +3948,7 @@
           <a:lstStyle/>
           <a:p>
             <a:r>
-              <a:rPr lang="it-IT" dirty="0" err="1"/>
+              <a:rPr lang="en-US" dirty="0"/>
               <a:t>Collect</a:t>
             </a:r>
             <a:r>
@@ -3956,10 +3956,9 @@
               <a:t> all the scores of bachelor </a:t>
             </a:r>
             <a:r>
-              <a:rPr lang="it-IT" dirty="0" err="1"/>
+              <a:rPr lang="en-GB" dirty="0"/>
               <a:t>exams</a:t>
             </a:r>
-            <a:endParaRPr lang="it-IT" dirty="0"/>
           </a:p>
         </p:txBody>
       </p:sp>
@@ -4044,7 +4043,7 @@
           <a:lstStyle/>
           <a:p>
             <a:r>
-              <a:rPr lang="it-IT" dirty="0" err="1"/>
+              <a:rPr lang="en-GB" dirty="0"/>
               <a:t>Temporal</a:t>
             </a:r>
             <a:r>
@@ -4097,8 +4096,8 @@
         </p:nvSpPr>
         <p:spPr>
           <a:xfrm>
-            <a:off x="471947" y="1900727"/>
-            <a:ext cx="2892141" cy="4524315"/>
+            <a:off x="471947" y="2033635"/>
+            <a:ext cx="3133475" cy="4708981"/>
           </a:xfrm>
           <a:prstGeom prst="rect">
             <a:avLst/>
@@ -4112,62 +4111,161 @@
           <a:lstStyle/>
           <a:p>
             <a:r>
+              <a:rPr lang="en-US" sz="1200" b="1" dirty="0"/>
+              <a:t>Data Classification</a:t>
+            </a:r>
+          </a:p>
+          <a:p>
+            <a:pPr marL="171450" indent="-171450">
+              <a:buFont typeface="Arial" panose="020B0604020202020204" pitchFamily="34" charset="0"/>
+              <a:buChar char="•"/>
+            </a:pPr>
+            <a:r>
+              <a:rPr lang="en-US" sz="1200" b="1" dirty="0"/>
+              <a:t>Data Types</a:t>
+            </a:r>
+            <a:r>
               <a:rPr lang="en-US" sz="1200" dirty="0"/>
-              <a:t>Data Types:</a:t>
-            </a:r>
-          </a:p>
-          <a:p>
+              <a:t>: Numerical (exam scores), Time Series (dates).</a:t>
+            </a:r>
+          </a:p>
+          <a:p>
+            <a:pPr marL="171450" indent="-171450">
+              <a:buFont typeface="Arial" panose="020B0604020202020204" pitchFamily="34" charset="0"/>
+              <a:buChar char="•"/>
+            </a:pPr>
+            <a:r>
+              <a:rPr lang="en-US" sz="1200" b="1" dirty="0"/>
+              <a:t>Relationships</a:t>
+            </a:r>
             <a:r>
               <a:rPr lang="en-US" sz="1200" dirty="0"/>
-              <a:t>- Categorical Data: 'Date' represents time, which is a categorical variable.</a:t>
-            </a:r>
-          </a:p>
-          <a:p>
+              <a:t>: Temporal distribution of exam scores.</a:t>
+            </a:r>
+          </a:p>
+          <a:p>
+            <a:r>
+              <a:rPr lang="en-US" sz="1200" b="1" dirty="0"/>
+              <a:t>Visual Variables</a:t>
+            </a:r>
+          </a:p>
+          <a:p>
+            <a:pPr marL="171450" indent="-171450">
+              <a:buFont typeface="Arial" panose="020B0604020202020204" pitchFamily="34" charset="0"/>
+              <a:buChar char="•"/>
+            </a:pPr>
+            <a:r>
+              <a:rPr lang="en-US" sz="1200" b="1" dirty="0"/>
+              <a:t>X-axis</a:t>
+            </a:r>
             <a:r>
               <a:rPr lang="en-US" sz="1200" dirty="0"/>
-              <a:t>- Numerical Data: 'Grade' and 'Credits' are numerical variables.</a:t>
-            </a:r>
-          </a:p>
-          <a:p>
+              <a:t>: Time (Jan 2019 - Aug 2022).</a:t>
+            </a:r>
+          </a:p>
+          <a:p>
+            <a:pPr marL="171450" indent="-171450">
+              <a:buFont typeface="Arial" panose="020B0604020202020204" pitchFamily="34" charset="0"/>
+              <a:buChar char="•"/>
+            </a:pPr>
+            <a:r>
+              <a:rPr lang="en-US" sz="1200" b="1" dirty="0"/>
+              <a:t>Y-axis</a:t>
+            </a:r>
             <a:r>
               <a:rPr lang="en-US" sz="1200" dirty="0"/>
-              <a:t>Relationships:</a:t>
-            </a:r>
-          </a:p>
-          <a:p>
+              <a:t>: Exam Scores (18-30).</a:t>
+            </a:r>
+          </a:p>
+          <a:p>
+            <a:pPr marL="171450" indent="-171450">
+              <a:buFont typeface="Arial" panose="020B0604020202020204" pitchFamily="34" charset="0"/>
+              <a:buChar char="•"/>
+            </a:pPr>
+            <a:r>
+              <a:rPr lang="en-US" sz="1200" b="1" dirty="0"/>
+              <a:t>Line and markers</a:t>
+            </a:r>
             <a:r>
               <a:rPr lang="en-US" sz="1200" dirty="0"/>
-              <a:t>- Categorical (Nominal): 'Date' is nominal, representing distinct points in time.</a:t>
-            </a:r>
-          </a:p>
-          <a:p>
+              <a:t>: temporal distribution</a:t>
+            </a:r>
+            <a:endParaRPr lang="en-US" sz="1200" b="1" dirty="0"/>
+          </a:p>
+          <a:p>
+            <a:r>
+              <a:rPr lang="en-US" sz="1200" b="1" dirty="0"/>
+              <a:t>Plot Description</a:t>
+            </a:r>
+          </a:p>
+          <a:p>
+            <a:pPr marL="171450" indent="-171450">
+              <a:buFont typeface="Arial" panose="020B0604020202020204" pitchFamily="34" charset="0"/>
+              <a:buChar char="•"/>
+            </a:pPr>
             <a:r>
               <a:rPr lang="en-US" sz="1200" dirty="0"/>
-              <a:t>- Quantitative (Ratio): 'Grade' and 'Credits' are ratio variables as they have a true zero point (0) and support meaningful arithmetic operations.</a:t>
-            </a:r>
-          </a:p>
-          <a:p>
+              <a:t>The plot shows the temporal distribution of exam scores over time.</a:t>
+            </a:r>
+          </a:p>
+          <a:p>
+            <a:pPr marL="171450" indent="-171450">
+              <a:buFont typeface="Arial" panose="020B0604020202020204" pitchFamily="34" charset="0"/>
+              <a:buChar char="•"/>
+            </a:pPr>
             <a:r>
               <a:rPr lang="en-US" sz="1200" dirty="0"/>
-              <a:t>Visual Variables/Variations:</a:t>
-            </a:r>
-          </a:p>
-          <a:p>
+              <a:t>Each data point represents an exam score.</a:t>
+            </a:r>
+          </a:p>
+          <a:p>
+            <a:pPr marL="171450" indent="-171450">
+              <a:buFont typeface="Arial" panose="020B0604020202020204" pitchFamily="34" charset="0"/>
+              <a:buChar char="•"/>
+            </a:pPr>
+            <a:r>
+              <a:rPr lang="en-US" sz="1200" b="1" dirty="0"/>
+              <a:t>Shaded regions </a:t>
+            </a:r>
             <a:r>
               <a:rPr lang="en-US" sz="1200" dirty="0"/>
-              <a:t>Bar heights represent the 'Grade' numerical values.</a:t>
-            </a:r>
-          </a:p>
-          <a:p>
+              <a:t>indicate exam sessions in January/February, June/July, and September.</a:t>
+            </a:r>
+          </a:p>
+          <a:p>
+            <a:pPr marL="171450" indent="-171450">
+              <a:buFont typeface="Arial" panose="020B0604020202020204" pitchFamily="34" charset="0"/>
+              <a:buChar char="•"/>
+            </a:pPr>
             <a:r>
               <a:rPr lang="en-US" sz="1200" dirty="0"/>
-              <a:t>Colors are used to distinguish different elements in the graph: bars have one color, cumulative weighted mean, cumulative simple mean, and a simple grade mean are represented by different line colors.</a:t>
-            </a:r>
-          </a:p>
-          <a:p>
+              <a:t>X-tick labels are formatted as 'Month Year' for clarity.</a:t>
+            </a:r>
+          </a:p>
+          <a:p>
+            <a:r>
+              <a:rPr lang="en-US" sz="1200" b="1" dirty="0"/>
+              <a:t>Analysis</a:t>
+            </a:r>
+          </a:p>
+          <a:p>
+            <a:pPr marL="171450" indent="-171450">
+              <a:buFont typeface="Arial" panose="020B0604020202020204" pitchFamily="34" charset="0"/>
+              <a:buChar char="•"/>
+            </a:pPr>
             <a:r>
               <a:rPr lang="en-US" sz="1200" dirty="0"/>
-              <a:t>Line styles are used for differentiation: solid line for bar heights, dashed line for cumulative weighted mean, and dash-dot line for cumulative simple mean.</a:t>
+              <a:t>The scores fluctuate very much over time</a:t>
+            </a:r>
+          </a:p>
+          <a:p>
+            <a:pPr marL="171450" indent="-171450">
+              <a:buFont typeface="Arial" panose="020B0604020202020204" pitchFamily="34" charset="0"/>
+              <a:buChar char="•"/>
+            </a:pPr>
+            <a:r>
+              <a:rPr lang="en-US" sz="1200" dirty="0"/>
+              <a:t>Over time, academic performance shifted: In the first half (before 2021), three exams scored under 22 and only one over 28. In the second half (from 2021 onward), just one scored under 22, while five exceeded 28.</a:t>
             </a:r>
           </a:p>
         </p:txBody>
@@ -4251,8 +4349,8 @@
         </p:blipFill>
         <p:spPr>
           <a:xfrm>
-            <a:off x="3364089" y="1900727"/>
-            <a:ext cx="8355963" cy="4957272"/>
+            <a:off x="3364090" y="1900727"/>
+            <a:ext cx="8355961" cy="4957272"/>
           </a:xfrm>
           <a:prstGeom prst="rect">
             <a:avLst/>
@@ -4273,8 +4371,8 @@
         </p:nvSpPr>
         <p:spPr>
           <a:xfrm>
-            <a:off x="471947" y="1900727"/>
-            <a:ext cx="2892141" cy="4524315"/>
+            <a:off x="471949" y="1900727"/>
+            <a:ext cx="3017701" cy="4893647"/>
           </a:xfrm>
           <a:prstGeom prst="rect">
             <a:avLst/>
@@ -4288,62 +4386,164 @@
           <a:lstStyle/>
           <a:p>
             <a:r>
+              <a:rPr lang="en-US" sz="1200" b="1" dirty="0"/>
+              <a:t>Data Classification</a:t>
+            </a:r>
+          </a:p>
+          <a:p>
+            <a:pPr marL="171450" indent="-171450">
+              <a:buFont typeface="Arial" panose="020B0604020202020204" pitchFamily="34" charset="0"/>
+              <a:buChar char="•"/>
+            </a:pPr>
+            <a:r>
+              <a:rPr lang="en-US" sz="1200" b="1" dirty="0"/>
+              <a:t>Data Types</a:t>
+            </a:r>
+            <a:r>
               <a:rPr lang="en-US" sz="1200" dirty="0"/>
-              <a:t>Data Types:</a:t>
-            </a:r>
-          </a:p>
-          <a:p>
+              <a:t>: Numerical (exam scores, credits), Time Series (dates)</a:t>
+            </a:r>
+          </a:p>
+          <a:p>
+            <a:pPr marL="171450" indent="-171450">
+              <a:buFont typeface="Arial" panose="020B0604020202020204" pitchFamily="34" charset="0"/>
+              <a:buChar char="•"/>
+            </a:pPr>
+            <a:r>
+              <a:rPr lang="en-US" sz="1200" b="1" dirty="0"/>
+              <a:t>Relationships</a:t>
+            </a:r>
             <a:r>
               <a:rPr lang="en-US" sz="1200" dirty="0"/>
-              <a:t>- Categorical Data: 'Date' represents time, which is a categorical variable.</a:t>
-            </a:r>
-          </a:p>
-          <a:p>
+              <a:t>: distribution of exam scores and cumulative performance.</a:t>
+            </a:r>
+          </a:p>
+          <a:p>
+            <a:pPr marL="171450" indent="-171450">
+              <a:buFont typeface="Arial" panose="020B0604020202020204" pitchFamily="34" charset="0"/>
+              <a:buChar char="•"/>
+            </a:pPr>
+            <a:r>
+              <a:rPr lang="en-US" sz="1200" b="1" dirty="0"/>
+              <a:t>Quantitative Variables</a:t>
+            </a:r>
             <a:r>
               <a:rPr lang="en-US" sz="1200" dirty="0"/>
-              <a:t>- Numerical Data: 'Grade' and 'Credits' are numerical variables.</a:t>
-            </a:r>
-          </a:p>
-          <a:p>
+              <a:t>: Exam scores, cumulative mean, cumulative weighted mean.</a:t>
+            </a:r>
+          </a:p>
+          <a:p>
+            <a:r>
+              <a:rPr lang="en-US" sz="1200" b="1" dirty="0"/>
+              <a:t>Visual Variables</a:t>
+            </a:r>
+          </a:p>
+          <a:p>
+            <a:pPr marL="171450" indent="-171450">
+              <a:buFont typeface="Arial" panose="020B0604020202020204" pitchFamily="34" charset="0"/>
+              <a:buChar char="•"/>
+            </a:pPr>
+            <a:r>
+              <a:rPr lang="en-US" sz="1200" b="1" dirty="0"/>
+              <a:t>X-axis</a:t>
+            </a:r>
             <a:r>
               <a:rPr lang="en-US" sz="1200" dirty="0"/>
-              <a:t>Relationships:</a:t>
-            </a:r>
-          </a:p>
-          <a:p>
+              <a:t>: Time (Jan 2019 - Aug 2022).</a:t>
+            </a:r>
+          </a:p>
+          <a:p>
+            <a:pPr marL="171450" indent="-171450">
+              <a:buFont typeface="Arial" panose="020B0604020202020204" pitchFamily="34" charset="0"/>
+              <a:buChar char="•"/>
+            </a:pPr>
+            <a:r>
+              <a:rPr lang="en-US" sz="1200" b="1" dirty="0"/>
+              <a:t>Y-axis</a:t>
+            </a:r>
             <a:r>
               <a:rPr lang="en-US" sz="1200" dirty="0"/>
-              <a:t>- Categorical (Nominal): 'Date' is nominal, representing distinct points in time.</a:t>
-            </a:r>
-          </a:p>
-          <a:p>
+              <a:t>: Exam Scores (18-30).</a:t>
+            </a:r>
+          </a:p>
+          <a:p>
+            <a:pPr marL="171450" indent="-171450">
+              <a:buFont typeface="Arial" panose="020B0604020202020204" pitchFamily="34" charset="0"/>
+              <a:buChar char="•"/>
+            </a:pPr>
+            <a:r>
+              <a:rPr lang="en-US" sz="1200" b="1" dirty="0"/>
+              <a:t>Bars</a:t>
+            </a:r>
             <a:r>
               <a:rPr lang="en-US" sz="1200" dirty="0"/>
-              <a:t>- Quantitative (Ratio): 'Grade' and 'Credits' are ratio variables as they have a true zero point (0) and support meaningful arithmetic operations.</a:t>
-            </a:r>
-          </a:p>
-          <a:p>
+              <a:t>: Exam scores.</a:t>
+            </a:r>
+          </a:p>
+          <a:p>
+            <a:pPr marL="171450" indent="-171450">
+              <a:buFont typeface="Arial" panose="020B0604020202020204" pitchFamily="34" charset="0"/>
+              <a:buChar char="•"/>
+            </a:pPr>
+            <a:r>
+              <a:rPr lang="en-US" sz="1200" b="1" dirty="0"/>
+              <a:t>Lines</a:t>
+            </a:r>
             <a:r>
               <a:rPr lang="en-US" sz="1200" dirty="0"/>
-              <a:t>Visual Variables/Variations:</a:t>
-            </a:r>
-          </a:p>
-          <a:p>
+              <a:t>: Cumulative Weighted Mean and Cumulative Simple Mean.</a:t>
+            </a:r>
+          </a:p>
+          <a:p>
+            <a:r>
+              <a:rPr lang="en-US" sz="1200" b="1" dirty="0"/>
+              <a:t>Plot Description</a:t>
+            </a:r>
+          </a:p>
+          <a:p>
+            <a:pPr marL="171450" indent="-171450">
+              <a:buFont typeface="Arial" panose="020B0604020202020204" pitchFamily="34" charset="0"/>
+              <a:buChar char="•"/>
+            </a:pPr>
             <a:r>
               <a:rPr lang="en-US" sz="1200" dirty="0"/>
-              <a:t>Bar heights represent the 'Grade' numerical values.</a:t>
-            </a:r>
-          </a:p>
-          <a:p>
+              <a:t>The plot shows the local and global performance of exam scores over time.</a:t>
+            </a:r>
+          </a:p>
+          <a:p>
+            <a:pPr marL="171450" indent="-171450">
+              <a:buFont typeface="Arial" panose="020B0604020202020204" pitchFamily="34" charset="0"/>
+              <a:buChar char="•"/>
+            </a:pPr>
             <a:r>
               <a:rPr lang="en-US" sz="1200" dirty="0"/>
-              <a:t>Colors are used to distinguish different elements in the graph: bars have one color, cumulative weighted mean, cumulative simple mean, and a simple grade mean are represented by different line colors.</a:t>
-            </a:r>
-          </a:p>
-          <a:p>
+              <a:t>Each bar represents exam scores at a session.</a:t>
+            </a:r>
+          </a:p>
+          <a:p>
+            <a:pPr marL="171450" indent="-171450">
+              <a:buFont typeface="Arial" panose="020B0604020202020204" pitchFamily="34" charset="0"/>
+              <a:buChar char="•"/>
+            </a:pPr>
             <a:r>
               <a:rPr lang="en-US" sz="1200" dirty="0"/>
-              <a:t>Line styles are used for differentiation: solid line for bar heights, dashed line for cumulative weighted mean, and dash-dot line for cumulative simple mean.</a:t>
+              <a:t>Lines indicate Cumulative Weighted Mean and Cumulative Simple Mean and  final Weighted Mean.</a:t>
+            </a:r>
+          </a:p>
+          <a:p>
+            <a:r>
+              <a:rPr lang="en-US" sz="1200" b="1" dirty="0"/>
+              <a:t>Analysis</a:t>
+            </a:r>
+          </a:p>
+          <a:p>
+            <a:pPr marL="171450" indent="-171450">
+              <a:buFont typeface="Arial" panose="020B0604020202020204" pitchFamily="34" charset="0"/>
+              <a:buChar char="•"/>
+            </a:pPr>
+            <a:r>
+              <a:rPr lang="en-US" sz="1200" dirty="0"/>
+              <a:t>We can see the important improvement over the time, along with the difference between simple and average means.</a:t>
             </a:r>
           </a:p>
         </p:txBody>
@@ -4400,7 +4600,7 @@
           <a:lstStyle/>
           <a:p>
             <a:r>
-              <a:rPr lang="it-IT" dirty="0" err="1"/>
+              <a:rPr lang="en-GB" dirty="0"/>
               <a:t>Individual</a:t>
             </a:r>
             <a:r>
@@ -4432,7 +4632,7 @@
         <p:spPr>
           <a:xfrm>
             <a:off x="3373525" y="1900727"/>
-            <a:ext cx="8337091" cy="4957273"/>
+            <a:ext cx="8337091" cy="4957272"/>
           </a:xfrm>
           <a:prstGeom prst="rect">
             <a:avLst/>
@@ -4453,8 +4653,8 @@
         </p:nvSpPr>
         <p:spPr>
           <a:xfrm>
-            <a:off x="471947" y="1900727"/>
-            <a:ext cx="2892141" cy="4524315"/>
+            <a:off x="481384" y="1994033"/>
+            <a:ext cx="3092240" cy="4832092"/>
           </a:xfrm>
           <a:prstGeom prst="rect">
             <a:avLst/>
@@ -4468,62 +4668,172 @@
           <a:lstStyle/>
           <a:p>
             <a:r>
-              <a:rPr lang="en-US" sz="1200" dirty="0"/>
-              <a:t>Data Types:</a:t>
-            </a:r>
-          </a:p>
-          <a:p>
-            <a:r>
-              <a:rPr lang="en-US" sz="1200" dirty="0"/>
-              <a:t>- Categorical Data: 'Date' represents time, which is a categorical variable.</a:t>
-            </a:r>
-          </a:p>
-          <a:p>
-            <a:r>
-              <a:rPr lang="en-US" sz="1200" dirty="0"/>
-              <a:t>- Numerical Data: 'Grade' and 'Credits' are numerical variables.</a:t>
-            </a:r>
-          </a:p>
-          <a:p>
-            <a:r>
-              <a:rPr lang="en-US" sz="1200" dirty="0"/>
-              <a:t>Relationships:</a:t>
-            </a:r>
-          </a:p>
-          <a:p>
-            <a:r>
-              <a:rPr lang="en-US" sz="1200" dirty="0"/>
-              <a:t>- Categorical (Nominal): 'Date' is nominal, representing distinct points in time.</a:t>
-            </a:r>
-          </a:p>
-          <a:p>
-            <a:r>
-              <a:rPr lang="en-US" sz="1200" dirty="0"/>
-              <a:t>- Quantitative (Ratio): 'Grade' and 'Credits' are ratio variables as they have a true zero point (0) and support meaningful arithmetic operations.</a:t>
-            </a:r>
-          </a:p>
-          <a:p>
-            <a:r>
-              <a:rPr lang="en-US" sz="1200" dirty="0"/>
-              <a:t>Visual Variables/Variations:</a:t>
-            </a:r>
-          </a:p>
-          <a:p>
-            <a:r>
-              <a:rPr lang="en-US" sz="1200" dirty="0"/>
-              <a:t>Bar heights represent the 'Grade' numerical values.</a:t>
-            </a:r>
-          </a:p>
-          <a:p>
-            <a:r>
-              <a:rPr lang="en-US" sz="1200" dirty="0"/>
-              <a:t>Colors are used to distinguish different elements in the graph: bars have one color, cumulative weighted mean, cumulative simple mean, and a simple grade mean are represented by different line colors.</a:t>
-            </a:r>
-          </a:p>
-          <a:p>
-            <a:r>
-              <a:rPr lang="en-US" sz="1200" dirty="0"/>
-              <a:t>Line styles are used for differentiation: solid line for bar heights, dashed line for cumulative weighted mean, and dash-dot line for cumulative simple mean.</a:t>
+              <a:rPr lang="en-US" sz="1100" b="1" dirty="0"/>
+              <a:t>Data Classification</a:t>
+            </a:r>
+          </a:p>
+          <a:p>
+            <a:pPr marL="171450" indent="-171450">
+              <a:buFont typeface="Arial" panose="020B0604020202020204" pitchFamily="34" charset="0"/>
+              <a:buChar char="•"/>
+            </a:pPr>
+            <a:r>
+              <a:rPr lang="en-US" sz="1100" b="1" dirty="0"/>
+              <a:t>Data Types</a:t>
+            </a:r>
+            <a:r>
+              <a:rPr lang="en-US" sz="1100" dirty="0"/>
+              <a:t>: Numerical (exam scores, credits), Time Series (dates)</a:t>
+            </a:r>
+          </a:p>
+          <a:p>
+            <a:pPr marL="171450" indent="-171450">
+              <a:buFont typeface="Arial" panose="020B0604020202020204" pitchFamily="34" charset="0"/>
+              <a:buChar char="•"/>
+            </a:pPr>
+            <a:r>
+              <a:rPr lang="en-US" sz="1100" b="1" dirty="0"/>
+              <a:t>Relationships</a:t>
+            </a:r>
+            <a:r>
+              <a:rPr lang="en-US" sz="1100" dirty="0"/>
+              <a:t>: distribution of exam scores and cumulative performance.</a:t>
+            </a:r>
+          </a:p>
+          <a:p>
+            <a:pPr marL="171450" indent="-171450">
+              <a:buFont typeface="Arial" panose="020B0604020202020204" pitchFamily="34" charset="0"/>
+              <a:buChar char="•"/>
+            </a:pPr>
+            <a:r>
+              <a:rPr lang="en-US" sz="1100" b="1" dirty="0"/>
+              <a:t>Quantitative Variables</a:t>
+            </a:r>
+            <a:r>
+              <a:rPr lang="en-US" sz="1100" dirty="0"/>
+              <a:t>: Exam scores, group mean, cumulative means, cumulative weighted means.</a:t>
+            </a:r>
+          </a:p>
+          <a:p>
+            <a:r>
+              <a:rPr lang="en-US" sz="1100" b="1" dirty="0"/>
+              <a:t>Visual Variables</a:t>
+            </a:r>
+          </a:p>
+          <a:p>
+            <a:pPr marL="171450" indent="-171450">
+              <a:buFont typeface="Arial" panose="020B0604020202020204" pitchFamily="34" charset="0"/>
+              <a:buChar char="•"/>
+            </a:pPr>
+            <a:r>
+              <a:rPr lang="en-US" sz="1100" b="1" dirty="0"/>
+              <a:t>X-axis</a:t>
+            </a:r>
+            <a:r>
+              <a:rPr lang="en-US" sz="1100" dirty="0"/>
+              <a:t>: Time (Jan 2019 - Aug 2022).</a:t>
+            </a:r>
+          </a:p>
+          <a:p>
+            <a:pPr marL="171450" indent="-171450">
+              <a:buFont typeface="Arial" panose="020B0604020202020204" pitchFamily="34" charset="0"/>
+              <a:buChar char="•"/>
+            </a:pPr>
+            <a:r>
+              <a:rPr lang="en-US" sz="1100" b="1" dirty="0"/>
+              <a:t>Y-axis</a:t>
+            </a:r>
+            <a:r>
+              <a:rPr lang="en-US" sz="1100" dirty="0"/>
+              <a:t>: Exam Scores (18-30).</a:t>
+            </a:r>
+          </a:p>
+          <a:p>
+            <a:pPr marL="171450" indent="-171450">
+              <a:buFont typeface="Arial" panose="020B0604020202020204" pitchFamily="34" charset="0"/>
+              <a:buChar char="•"/>
+            </a:pPr>
+            <a:r>
+              <a:rPr lang="en-US" sz="1100" b="1" dirty="0"/>
+              <a:t>Bars</a:t>
+            </a:r>
+            <a:r>
+              <a:rPr lang="en-US" sz="1100" dirty="0"/>
+              <a:t>: Exam scores.</a:t>
+            </a:r>
+          </a:p>
+          <a:p>
+            <a:pPr marL="171450" indent="-171450">
+              <a:buFont typeface="Arial" panose="020B0604020202020204" pitchFamily="34" charset="0"/>
+              <a:buChar char="•"/>
+            </a:pPr>
+            <a:r>
+              <a:rPr lang="en-US" sz="1100" b="1" dirty="0"/>
+              <a:t>Lines</a:t>
+            </a:r>
+            <a:r>
+              <a:rPr lang="en-US" sz="1100" dirty="0"/>
+              <a:t>: Cumulative Weighted Mean and Cumulative Simple Mean.</a:t>
+            </a:r>
+          </a:p>
+          <a:p>
+            <a:pPr marL="171450" indent="-171450">
+              <a:buFont typeface="Arial" panose="020B0604020202020204" pitchFamily="34" charset="0"/>
+              <a:buChar char="•"/>
+            </a:pPr>
+            <a:r>
+              <a:rPr lang="en-US" sz="1100" b="1" dirty="0"/>
+              <a:t>Colors</a:t>
+            </a:r>
+            <a:r>
+              <a:rPr lang="en-US" sz="1100" dirty="0"/>
+              <a:t>: Different colors for each person.</a:t>
+            </a:r>
+          </a:p>
+          <a:p>
+            <a:r>
+              <a:rPr lang="en-US" sz="1100" b="1" dirty="0"/>
+              <a:t>Plot Description and Analysis</a:t>
+            </a:r>
+          </a:p>
+          <a:p>
+            <a:pPr marL="171450" indent="-171450">
+              <a:buFont typeface="Arial" panose="020B0604020202020204" pitchFamily="34" charset="0"/>
+              <a:buChar char="•"/>
+            </a:pPr>
+            <a:r>
+              <a:rPr lang="en-US" sz="1100" dirty="0"/>
+              <a:t>The plot displays the local performance of individuals in exams over time.</a:t>
+            </a:r>
+          </a:p>
+          <a:p>
+            <a:pPr marL="171450" indent="-171450">
+              <a:buFont typeface="Arial" panose="020B0604020202020204" pitchFamily="34" charset="0"/>
+              <a:buChar char="•"/>
+            </a:pPr>
+            <a:r>
+              <a:rPr lang="en-US" sz="1100" dirty="0"/>
+              <a:t>Each bar represents an individual's performance on different exams.</a:t>
+            </a:r>
+          </a:p>
+          <a:p>
+            <a:pPr marL="171450" indent="-171450">
+              <a:buFont typeface="Arial" panose="020B0604020202020204" pitchFamily="34" charset="0"/>
+              <a:buChar char="•"/>
+            </a:pPr>
+            <a:r>
+              <a:rPr lang="en-US" sz="1100" dirty="0"/>
+              <a:t>Cumulative Weighted Mean lines show performance trends for each person.</a:t>
+            </a:r>
+          </a:p>
+          <a:p>
+            <a:pPr marL="171450" indent="-171450">
+              <a:buFont typeface="Arial" panose="020B0604020202020204" pitchFamily="34" charset="0"/>
+              <a:buChar char="•"/>
+            </a:pPr>
+            <a:r>
+              <a:rPr lang="en-US" sz="1100" dirty="0"/>
+              <a:t>We can see important variations between individuals over the time, along with the difference between average means. We can clearly observe exams where individuals have similar marks, as well as exams with significant differences in their scores.</a:t>
             </a:r>
           </a:p>
         </p:txBody>
@@ -4580,12 +4890,8 @@
           <a:lstStyle/>
           <a:p>
             <a:r>
-              <a:rPr lang="it-IT" dirty="0" err="1"/>
-              <a:t>Individual</a:t>
-            </a:r>
-            <a:r>
               <a:rPr lang="it-IT" dirty="0"/>
-              <a:t> and group global performance</a:t>
+              <a:t>Individual and group global performance</a:t>
             </a:r>
           </a:p>
         </p:txBody>
@@ -4613,7 +4919,7 @@
         </p:blipFill>
         <p:spPr>
           <a:xfrm>
-            <a:off x="7788460" y="1989572"/>
+            <a:off x="7835115" y="1989572"/>
             <a:ext cx="4353909" cy="4722075"/>
           </a:xfrm>
         </p:spPr>
@@ -4641,7 +4947,7 @@
         </p:blipFill>
         <p:spPr>
           <a:xfrm>
-            <a:off x="4621161" y="1989573"/>
+            <a:off x="4667816" y="1989573"/>
             <a:ext cx="3167299" cy="4722075"/>
           </a:xfrm>
         </p:spPr>
@@ -4660,8 +4966,8 @@
         </p:nvSpPr>
         <p:spPr>
           <a:xfrm>
-            <a:off x="471947" y="1900727"/>
-            <a:ext cx="3087330" cy="4524315"/>
+            <a:off x="471946" y="1900727"/>
+            <a:ext cx="4277335" cy="3600986"/>
           </a:xfrm>
           <a:prstGeom prst="rect">
             <a:avLst/>

</xml_diff>